<commit_message>
beta 1 version camera ready
</commit_message>
<xml_diff>
--- a/figura relacion clahe pso.pptx
+++ b/figura relacion clahe pso.pptx
@@ -1,19 +1,114 @@
 
 <file path=ppt/presentation.xml><?xml version="1.0" encoding="utf-8"?>
-<p:presentation xmlns:a="http://schemas.openxmlformats.org/drawingml/2006/main" xmlns:p="http://schemas.openxmlformats.org/presentationml/2006/main" xmlns:r="http://schemas.openxmlformats.org/officeDocument/2006/relationships">
+<p:presentation xmlns:a="http://schemas.openxmlformats.org/drawingml/2006/main" xmlns:r="http://schemas.openxmlformats.org/officeDocument/2006/relationships" xmlns:p="http://schemas.openxmlformats.org/presentationml/2006/main">
   <p:sldMasterIdLst>
-    <p:sldMasterId id="2147483648" r:id="rId2"/>
+    <p:sldMasterId id="2147483648" r:id="rId1"/>
   </p:sldMasterIdLst>
   <p:sldIdLst>
-    <p:sldId id="256" r:id="rId3"/>
+    <p:sldId id="256" r:id="rId2"/>
   </p:sldIdLst>
-  <p:sldSz cx="9144000" cy="8999537"/>
-  <p:notesSz cx="7559675" cy="10691812"/>
+  <p:sldSz cx="9144000" cy="8999538"/>
+  <p:notesSz cx="7559675" cy="10691813"/>
+  <p:defaultTextStyle>
+    <a:defPPr>
+      <a:defRPr lang="es-ES"/>
+    </a:defPPr>
+    <a:lvl1pPr marL="0" algn="l" defTabSz="914400" rtl="0" eaLnBrk="1" latinLnBrk="0" hangingPunct="1">
+      <a:defRPr sz="1800" kern="1200">
+        <a:solidFill>
+          <a:schemeClr val="tx1"/>
+        </a:solidFill>
+        <a:latin typeface="+mn-lt"/>
+        <a:ea typeface="+mn-ea"/>
+        <a:cs typeface="+mn-cs"/>
+      </a:defRPr>
+    </a:lvl1pPr>
+    <a:lvl2pPr marL="457200" algn="l" defTabSz="914400" rtl="0" eaLnBrk="1" latinLnBrk="0" hangingPunct="1">
+      <a:defRPr sz="1800" kern="1200">
+        <a:solidFill>
+          <a:schemeClr val="tx1"/>
+        </a:solidFill>
+        <a:latin typeface="+mn-lt"/>
+        <a:ea typeface="+mn-ea"/>
+        <a:cs typeface="+mn-cs"/>
+      </a:defRPr>
+    </a:lvl2pPr>
+    <a:lvl3pPr marL="914400" algn="l" defTabSz="914400" rtl="0" eaLnBrk="1" latinLnBrk="0" hangingPunct="1">
+      <a:defRPr sz="1800" kern="1200">
+        <a:solidFill>
+          <a:schemeClr val="tx1"/>
+        </a:solidFill>
+        <a:latin typeface="+mn-lt"/>
+        <a:ea typeface="+mn-ea"/>
+        <a:cs typeface="+mn-cs"/>
+      </a:defRPr>
+    </a:lvl3pPr>
+    <a:lvl4pPr marL="1371600" algn="l" defTabSz="914400" rtl="0" eaLnBrk="1" latinLnBrk="0" hangingPunct="1">
+      <a:defRPr sz="1800" kern="1200">
+        <a:solidFill>
+          <a:schemeClr val="tx1"/>
+        </a:solidFill>
+        <a:latin typeface="+mn-lt"/>
+        <a:ea typeface="+mn-ea"/>
+        <a:cs typeface="+mn-cs"/>
+      </a:defRPr>
+    </a:lvl4pPr>
+    <a:lvl5pPr marL="1828800" algn="l" defTabSz="914400" rtl="0" eaLnBrk="1" latinLnBrk="0" hangingPunct="1">
+      <a:defRPr sz="1800" kern="1200">
+        <a:solidFill>
+          <a:schemeClr val="tx1"/>
+        </a:solidFill>
+        <a:latin typeface="+mn-lt"/>
+        <a:ea typeface="+mn-ea"/>
+        <a:cs typeface="+mn-cs"/>
+      </a:defRPr>
+    </a:lvl5pPr>
+    <a:lvl6pPr marL="2286000" algn="l" defTabSz="914400" rtl="0" eaLnBrk="1" latinLnBrk="0" hangingPunct="1">
+      <a:defRPr sz="1800" kern="1200">
+        <a:solidFill>
+          <a:schemeClr val="tx1"/>
+        </a:solidFill>
+        <a:latin typeface="+mn-lt"/>
+        <a:ea typeface="+mn-ea"/>
+        <a:cs typeface="+mn-cs"/>
+      </a:defRPr>
+    </a:lvl6pPr>
+    <a:lvl7pPr marL="2743200" algn="l" defTabSz="914400" rtl="0" eaLnBrk="1" latinLnBrk="0" hangingPunct="1">
+      <a:defRPr sz="1800" kern="1200">
+        <a:solidFill>
+          <a:schemeClr val="tx1"/>
+        </a:solidFill>
+        <a:latin typeface="+mn-lt"/>
+        <a:ea typeface="+mn-ea"/>
+        <a:cs typeface="+mn-cs"/>
+      </a:defRPr>
+    </a:lvl7pPr>
+    <a:lvl8pPr marL="3200400" algn="l" defTabSz="914400" rtl="0" eaLnBrk="1" latinLnBrk="0" hangingPunct="1">
+      <a:defRPr sz="1800" kern="1200">
+        <a:solidFill>
+          <a:schemeClr val="tx1"/>
+        </a:solidFill>
+        <a:latin typeface="+mn-lt"/>
+        <a:ea typeface="+mn-ea"/>
+        <a:cs typeface="+mn-cs"/>
+      </a:defRPr>
+    </a:lvl8pPr>
+    <a:lvl9pPr marL="3657600" algn="l" defTabSz="914400" rtl="0" eaLnBrk="1" latinLnBrk="0" hangingPunct="1">
+      <a:defRPr sz="1800" kern="1200">
+        <a:solidFill>
+          <a:schemeClr val="tx1"/>
+        </a:solidFill>
+        <a:latin typeface="+mn-lt"/>
+        <a:ea typeface="+mn-ea"/>
+        <a:cs typeface="+mn-cs"/>
+      </a:defRPr>
+    </a:lvl9pPr>
+  </p:defaultTextStyle>
 </p:presentation>
 </file>
 
 <file path=ppt/slideLayouts/slideLayout1.xml><?xml version="1.0" encoding="utf-8"?>
-<p:sldLayout xmlns:a="http://schemas.openxmlformats.org/drawingml/2006/main" xmlns:p="http://schemas.openxmlformats.org/presentationml/2006/main" xmlns:r="http://schemas.openxmlformats.org/officeDocument/2006/relationships" type="blank" preserve="1">
+<p:sldLayout xmlns:a="http://schemas.openxmlformats.org/drawingml/2006/main" xmlns:r="http://schemas.openxmlformats.org/officeDocument/2006/relationships" xmlns:p="http://schemas.openxmlformats.org/presentationml/2006/main" type="blank" preserve="1">
   <p:cSld name="Blank Slide">
     <p:spTree>
       <p:nvGrpSpPr>
@@ -31,11 +126,14 @@
       </p:grpSpPr>
     </p:spTree>
   </p:cSld>
+  <p:clrMapOvr>
+    <a:masterClrMapping/>
+  </p:clrMapOvr>
 </p:sldLayout>
 </file>
 
 <file path=ppt/slideLayouts/slideLayout10.xml><?xml version="1.0" encoding="utf-8"?>
-<p:sldLayout xmlns:a="http://schemas.openxmlformats.org/drawingml/2006/main" xmlns:p="http://schemas.openxmlformats.org/presentationml/2006/main" xmlns:r="http://schemas.openxmlformats.org/officeDocument/2006/relationships" type="objOverTx" preserve="1">
+<p:sldLayout xmlns:a="http://schemas.openxmlformats.org/drawingml/2006/main" xmlns:r="http://schemas.openxmlformats.org/officeDocument/2006/relationships" xmlns:p="http://schemas.openxmlformats.org/presentationml/2006/main" type="objOverTx" preserve="1">
   <p:cSld name="Title, Content over Content">
     <p:spTree>
       <p:nvGrpSpPr>
@@ -71,7 +169,8 @@
           </a:prstGeom>
         </p:spPr>
         <p:txBody>
-          <a:bodyPr lIns="0" rIns="0" tIns="0" bIns="0" anchor="ctr"/>
+          <a:bodyPr lIns="0" tIns="0" rIns="0" bIns="0" anchor="ctr"/>
+          <a:lstStyle/>
           <a:p>
             <a:pPr algn="ctr"/>
             <a:endParaRPr/>
@@ -98,7 +197,8 @@
           </a:prstGeom>
         </p:spPr>
         <p:txBody>
-          <a:bodyPr lIns="0" rIns="0" tIns="0" bIns="0"/>
+          <a:bodyPr lIns="0" tIns="0" rIns="0" bIns="0"/>
+          <a:lstStyle/>
           <a:p>
             <a:endParaRPr/>
           </a:p>
@@ -124,7 +224,8 @@
           </a:prstGeom>
         </p:spPr>
         <p:txBody>
-          <a:bodyPr lIns="0" rIns="0" tIns="0" bIns="0"/>
+          <a:bodyPr lIns="0" tIns="0" rIns="0" bIns="0"/>
+          <a:lstStyle/>
           <a:p>
             <a:endParaRPr/>
           </a:p>
@@ -132,11 +233,14 @@
       </p:sp>
     </p:spTree>
   </p:cSld>
+  <p:clrMapOvr>
+    <a:masterClrMapping/>
+  </p:clrMapOvr>
 </p:sldLayout>
 </file>
 
 <file path=ppt/slideLayouts/slideLayout11.xml><?xml version="1.0" encoding="utf-8"?>
-<p:sldLayout xmlns:a="http://schemas.openxmlformats.org/drawingml/2006/main" xmlns:p="http://schemas.openxmlformats.org/presentationml/2006/main" xmlns:r="http://schemas.openxmlformats.org/officeDocument/2006/relationships" type="fourObj" preserve="1">
+<p:sldLayout xmlns:a="http://schemas.openxmlformats.org/drawingml/2006/main" xmlns:r="http://schemas.openxmlformats.org/officeDocument/2006/relationships" xmlns:p="http://schemas.openxmlformats.org/presentationml/2006/main" type="fourObj" preserve="1">
   <p:cSld name="Title, 4 Content">
     <p:spTree>
       <p:nvGrpSpPr>
@@ -172,7 +276,8 @@
           </a:prstGeom>
         </p:spPr>
         <p:txBody>
-          <a:bodyPr lIns="0" rIns="0" tIns="0" bIns="0" anchor="ctr"/>
+          <a:bodyPr lIns="0" tIns="0" rIns="0" bIns="0" anchor="ctr"/>
+          <a:lstStyle/>
           <a:p>
             <a:pPr algn="ctr"/>
             <a:endParaRPr/>
@@ -199,7 +304,8 @@
           </a:prstGeom>
         </p:spPr>
         <p:txBody>
-          <a:bodyPr lIns="0" rIns="0" tIns="0" bIns="0"/>
+          <a:bodyPr lIns="0" tIns="0" rIns="0" bIns="0"/>
+          <a:lstStyle/>
           <a:p>
             <a:endParaRPr/>
           </a:p>
@@ -225,7 +331,8 @@
           </a:prstGeom>
         </p:spPr>
         <p:txBody>
-          <a:bodyPr lIns="0" rIns="0" tIns="0" bIns="0"/>
+          <a:bodyPr lIns="0" tIns="0" rIns="0" bIns="0"/>
+          <a:lstStyle/>
           <a:p>
             <a:endParaRPr/>
           </a:p>
@@ -251,7 +358,8 @@
           </a:prstGeom>
         </p:spPr>
         <p:txBody>
-          <a:bodyPr lIns="0" rIns="0" tIns="0" bIns="0"/>
+          <a:bodyPr lIns="0" tIns="0" rIns="0" bIns="0"/>
+          <a:lstStyle/>
           <a:p>
             <a:endParaRPr/>
           </a:p>
@@ -277,7 +385,8 @@
           </a:prstGeom>
         </p:spPr>
         <p:txBody>
-          <a:bodyPr lIns="0" rIns="0" tIns="0" bIns="0"/>
+          <a:bodyPr lIns="0" tIns="0" rIns="0" bIns="0"/>
+          <a:lstStyle/>
           <a:p>
             <a:endParaRPr/>
           </a:p>
@@ -285,11 +394,14 @@
       </p:sp>
     </p:spTree>
   </p:cSld>
+  <p:clrMapOvr>
+    <a:masterClrMapping/>
+  </p:clrMapOvr>
 </p:sldLayout>
 </file>
 
 <file path=ppt/slideLayouts/slideLayout12.xml><?xml version="1.0" encoding="utf-8"?>
-<p:sldLayout xmlns:a="http://schemas.openxmlformats.org/drawingml/2006/main" xmlns:p="http://schemas.openxmlformats.org/presentationml/2006/main" xmlns:r="http://schemas.openxmlformats.org/officeDocument/2006/relationships" type="blank" preserve="1">
+<p:sldLayout xmlns:a="http://schemas.openxmlformats.org/drawingml/2006/main" xmlns:r="http://schemas.openxmlformats.org/officeDocument/2006/relationships" xmlns:p="http://schemas.openxmlformats.org/presentationml/2006/main" type="blank" preserve="1">
   <p:cSld name="Title, 6 Content">
     <p:spTree>
       <p:nvGrpSpPr>
@@ -325,7 +437,8 @@
           </a:prstGeom>
         </p:spPr>
         <p:txBody>
-          <a:bodyPr lIns="0" rIns="0" tIns="0" bIns="0" anchor="ctr"/>
+          <a:bodyPr lIns="0" tIns="0" rIns="0" bIns="0" anchor="ctr"/>
+          <a:lstStyle/>
           <a:p>
             <a:pPr algn="ctr"/>
             <a:endParaRPr/>
@@ -352,7 +465,8 @@
           </a:prstGeom>
         </p:spPr>
         <p:txBody>
-          <a:bodyPr lIns="0" rIns="0" tIns="0" bIns="0"/>
+          <a:bodyPr lIns="0" tIns="0" rIns="0" bIns="0"/>
+          <a:lstStyle/>
           <a:p>
             <a:endParaRPr/>
           </a:p>
@@ -378,7 +492,8 @@
           </a:prstGeom>
         </p:spPr>
         <p:txBody>
-          <a:bodyPr lIns="0" rIns="0" tIns="0" bIns="0"/>
+          <a:bodyPr lIns="0" tIns="0" rIns="0" bIns="0"/>
+          <a:lstStyle/>
           <a:p>
             <a:endParaRPr/>
           </a:p>
@@ -386,7 +501,7 @@
       </p:sp>
       <p:pic>
         <p:nvPicPr>
-          <p:cNvPr id="34" name="" descr=""/>
+          <p:cNvPr id="34" name="Picture 33"/>
           <p:cNvPicPr/>
           <p:nvPr/>
         </p:nvPicPr>
@@ -411,12 +526,12 @@
       </p:pic>
       <p:pic>
         <p:nvPicPr>
-          <p:cNvPr id="35" name="" descr=""/>
+          <p:cNvPr id="35" name="Picture 34"/>
           <p:cNvPicPr/>
           <p:nvPr/>
         </p:nvPicPr>
         <p:blipFill>
-          <a:blip r:embed="rId3"/>
+          <a:blip r:embed="rId2"/>
           <a:stretch>
             <a:fillRect/>
           </a:stretch>
@@ -436,11 +551,14 @@
       </p:pic>
     </p:spTree>
   </p:cSld>
+  <p:clrMapOvr>
+    <a:masterClrMapping/>
+  </p:clrMapOvr>
 </p:sldLayout>
 </file>
 
 <file path=ppt/slideLayouts/slideLayout2.xml><?xml version="1.0" encoding="utf-8"?>
-<p:sldLayout xmlns:a="http://schemas.openxmlformats.org/drawingml/2006/main" xmlns:p="http://schemas.openxmlformats.org/presentationml/2006/main" xmlns:r="http://schemas.openxmlformats.org/officeDocument/2006/relationships" type="tx" preserve="1">
+<p:sldLayout xmlns:a="http://schemas.openxmlformats.org/drawingml/2006/main" xmlns:r="http://schemas.openxmlformats.org/officeDocument/2006/relationships" xmlns:p="http://schemas.openxmlformats.org/presentationml/2006/main" type="tx" preserve="1">
   <p:cSld name="Title Slide">
     <p:spTree>
       <p:nvGrpSpPr>
@@ -476,7 +594,8 @@
           </a:prstGeom>
         </p:spPr>
         <p:txBody>
-          <a:bodyPr lIns="0" rIns="0" tIns="0" bIns="0" anchor="ctr"/>
+          <a:bodyPr lIns="0" tIns="0" rIns="0" bIns="0" anchor="ctr"/>
+          <a:lstStyle/>
           <a:p>
             <a:pPr algn="ctr"/>
             <a:endParaRPr/>
@@ -503,7 +622,8 @@
           </a:prstGeom>
         </p:spPr>
         <p:txBody>
-          <a:bodyPr lIns="0" rIns="0" tIns="0" bIns="0" anchor="ctr"/>
+          <a:bodyPr lIns="0" tIns="0" rIns="0" bIns="0" anchor="ctr"/>
+          <a:lstStyle/>
           <a:p>
             <a:pPr algn="ctr"/>
             <a:endParaRPr/>
@@ -512,11 +632,14 @@
       </p:sp>
     </p:spTree>
   </p:cSld>
+  <p:clrMapOvr>
+    <a:masterClrMapping/>
+  </p:clrMapOvr>
 </p:sldLayout>
 </file>
 
 <file path=ppt/slideLayouts/slideLayout3.xml><?xml version="1.0" encoding="utf-8"?>
-<p:sldLayout xmlns:a="http://schemas.openxmlformats.org/drawingml/2006/main" xmlns:p="http://schemas.openxmlformats.org/presentationml/2006/main" xmlns:r="http://schemas.openxmlformats.org/officeDocument/2006/relationships" type="obj" preserve="1">
+<p:sldLayout xmlns:a="http://schemas.openxmlformats.org/drawingml/2006/main" xmlns:r="http://schemas.openxmlformats.org/officeDocument/2006/relationships" xmlns:p="http://schemas.openxmlformats.org/presentationml/2006/main" type="obj" preserve="1">
   <p:cSld name="Title, Content">
     <p:spTree>
       <p:nvGrpSpPr>
@@ -552,7 +675,8 @@
           </a:prstGeom>
         </p:spPr>
         <p:txBody>
-          <a:bodyPr lIns="0" rIns="0" tIns="0" bIns="0" anchor="ctr"/>
+          <a:bodyPr lIns="0" tIns="0" rIns="0" bIns="0" anchor="ctr"/>
+          <a:lstStyle/>
           <a:p>
             <a:pPr algn="ctr"/>
             <a:endParaRPr/>
@@ -579,7 +703,8 @@
           </a:prstGeom>
         </p:spPr>
         <p:txBody>
-          <a:bodyPr lIns="0" rIns="0" tIns="0" bIns="0"/>
+          <a:bodyPr lIns="0" tIns="0" rIns="0" bIns="0"/>
+          <a:lstStyle/>
           <a:p>
             <a:endParaRPr/>
           </a:p>
@@ -587,11 +712,14 @@
       </p:sp>
     </p:spTree>
   </p:cSld>
+  <p:clrMapOvr>
+    <a:masterClrMapping/>
+  </p:clrMapOvr>
 </p:sldLayout>
 </file>
 
 <file path=ppt/slideLayouts/slideLayout4.xml><?xml version="1.0" encoding="utf-8"?>
-<p:sldLayout xmlns:a="http://schemas.openxmlformats.org/drawingml/2006/main" xmlns:p="http://schemas.openxmlformats.org/presentationml/2006/main" xmlns:r="http://schemas.openxmlformats.org/officeDocument/2006/relationships" type="twoObj" preserve="1">
+<p:sldLayout xmlns:a="http://schemas.openxmlformats.org/drawingml/2006/main" xmlns:r="http://schemas.openxmlformats.org/officeDocument/2006/relationships" xmlns:p="http://schemas.openxmlformats.org/presentationml/2006/main" type="twoObj" preserve="1">
   <p:cSld name="Title, 2 Content">
     <p:spTree>
       <p:nvGrpSpPr>
@@ -627,7 +755,8 @@
           </a:prstGeom>
         </p:spPr>
         <p:txBody>
-          <a:bodyPr lIns="0" rIns="0" tIns="0" bIns="0" anchor="ctr"/>
+          <a:bodyPr lIns="0" tIns="0" rIns="0" bIns="0" anchor="ctr"/>
+          <a:lstStyle/>
           <a:p>
             <a:pPr algn="ctr"/>
             <a:endParaRPr/>
@@ -654,7 +783,8 @@
           </a:prstGeom>
         </p:spPr>
         <p:txBody>
-          <a:bodyPr lIns="0" rIns="0" tIns="0" bIns="0"/>
+          <a:bodyPr lIns="0" tIns="0" rIns="0" bIns="0"/>
+          <a:lstStyle/>
           <a:p>
             <a:endParaRPr/>
           </a:p>
@@ -680,7 +810,8 @@
           </a:prstGeom>
         </p:spPr>
         <p:txBody>
-          <a:bodyPr lIns="0" rIns="0" tIns="0" bIns="0"/>
+          <a:bodyPr lIns="0" tIns="0" rIns="0" bIns="0"/>
+          <a:lstStyle/>
           <a:p>
             <a:endParaRPr/>
           </a:p>
@@ -688,11 +819,14 @@
       </p:sp>
     </p:spTree>
   </p:cSld>
+  <p:clrMapOvr>
+    <a:masterClrMapping/>
+  </p:clrMapOvr>
 </p:sldLayout>
 </file>
 
 <file path=ppt/slideLayouts/slideLayout5.xml><?xml version="1.0" encoding="utf-8"?>
-<p:sldLayout xmlns:a="http://schemas.openxmlformats.org/drawingml/2006/main" xmlns:p="http://schemas.openxmlformats.org/presentationml/2006/main" xmlns:r="http://schemas.openxmlformats.org/officeDocument/2006/relationships" type="titleOnly" preserve="1">
+<p:sldLayout xmlns:a="http://schemas.openxmlformats.org/drawingml/2006/main" xmlns:r="http://schemas.openxmlformats.org/officeDocument/2006/relationships" xmlns:p="http://schemas.openxmlformats.org/presentationml/2006/main" type="titleOnly" preserve="1">
   <p:cSld name="Title Only">
     <p:spTree>
       <p:nvGrpSpPr>
@@ -728,7 +862,8 @@
           </a:prstGeom>
         </p:spPr>
         <p:txBody>
-          <a:bodyPr lIns="0" rIns="0" tIns="0" bIns="0" anchor="ctr"/>
+          <a:bodyPr lIns="0" tIns="0" rIns="0" bIns="0" anchor="ctr"/>
+          <a:lstStyle/>
           <a:p>
             <a:pPr algn="ctr"/>
             <a:endParaRPr/>
@@ -737,11 +872,14 @@
       </p:sp>
     </p:spTree>
   </p:cSld>
+  <p:clrMapOvr>
+    <a:masterClrMapping/>
+  </p:clrMapOvr>
 </p:sldLayout>
 </file>
 
 <file path=ppt/slideLayouts/slideLayout6.xml><?xml version="1.0" encoding="utf-8"?>
-<p:sldLayout xmlns:a="http://schemas.openxmlformats.org/drawingml/2006/main" xmlns:p="http://schemas.openxmlformats.org/presentationml/2006/main" xmlns:r="http://schemas.openxmlformats.org/officeDocument/2006/relationships" type="objOnly" preserve="1">
+<p:sldLayout xmlns:a="http://schemas.openxmlformats.org/drawingml/2006/main" xmlns:r="http://schemas.openxmlformats.org/officeDocument/2006/relationships" xmlns:p="http://schemas.openxmlformats.org/presentationml/2006/main" type="objOnly" preserve="1">
   <p:cSld name="Centered Text">
     <p:spTree>
       <p:nvGrpSpPr>
@@ -777,7 +915,8 @@
           </a:prstGeom>
         </p:spPr>
         <p:txBody>
-          <a:bodyPr lIns="0" rIns="0" tIns="0" bIns="0" anchor="ctr"/>
+          <a:bodyPr lIns="0" tIns="0" rIns="0" bIns="0" anchor="ctr"/>
+          <a:lstStyle/>
           <a:p>
             <a:pPr algn="ctr"/>
             <a:endParaRPr/>
@@ -786,11 +925,14 @@
       </p:sp>
     </p:spTree>
   </p:cSld>
+  <p:clrMapOvr>
+    <a:masterClrMapping/>
+  </p:clrMapOvr>
 </p:sldLayout>
 </file>
 
 <file path=ppt/slideLayouts/slideLayout7.xml><?xml version="1.0" encoding="utf-8"?>
-<p:sldLayout xmlns:a="http://schemas.openxmlformats.org/drawingml/2006/main" xmlns:p="http://schemas.openxmlformats.org/presentationml/2006/main" xmlns:r="http://schemas.openxmlformats.org/officeDocument/2006/relationships" type="twoObjAndObj" preserve="1">
+<p:sldLayout xmlns:a="http://schemas.openxmlformats.org/drawingml/2006/main" xmlns:r="http://schemas.openxmlformats.org/officeDocument/2006/relationships" xmlns:p="http://schemas.openxmlformats.org/presentationml/2006/main" type="twoObjAndObj" preserve="1">
   <p:cSld name="Title, 2 Content and Content">
     <p:spTree>
       <p:nvGrpSpPr>
@@ -826,7 +968,8 @@
           </a:prstGeom>
         </p:spPr>
         <p:txBody>
-          <a:bodyPr lIns="0" rIns="0" tIns="0" bIns="0" anchor="ctr"/>
+          <a:bodyPr lIns="0" tIns="0" rIns="0" bIns="0" anchor="ctr"/>
+          <a:lstStyle/>
           <a:p>
             <a:pPr algn="ctr"/>
             <a:endParaRPr/>
@@ -853,7 +996,8 @@
           </a:prstGeom>
         </p:spPr>
         <p:txBody>
-          <a:bodyPr lIns="0" rIns="0" tIns="0" bIns="0"/>
+          <a:bodyPr lIns="0" tIns="0" rIns="0" bIns="0"/>
+          <a:lstStyle/>
           <a:p>
             <a:endParaRPr/>
           </a:p>
@@ -879,7 +1023,8 @@
           </a:prstGeom>
         </p:spPr>
         <p:txBody>
-          <a:bodyPr lIns="0" rIns="0" tIns="0" bIns="0"/>
+          <a:bodyPr lIns="0" tIns="0" rIns="0" bIns="0"/>
+          <a:lstStyle/>
           <a:p>
             <a:endParaRPr/>
           </a:p>
@@ -905,7 +1050,8 @@
           </a:prstGeom>
         </p:spPr>
         <p:txBody>
-          <a:bodyPr lIns="0" rIns="0" tIns="0" bIns="0"/>
+          <a:bodyPr lIns="0" tIns="0" rIns="0" bIns="0"/>
+          <a:lstStyle/>
           <a:p>
             <a:endParaRPr/>
           </a:p>
@@ -913,11 +1059,14 @@
       </p:sp>
     </p:spTree>
   </p:cSld>
+  <p:clrMapOvr>
+    <a:masterClrMapping/>
+  </p:clrMapOvr>
 </p:sldLayout>
 </file>
 
 <file path=ppt/slideLayouts/slideLayout8.xml><?xml version="1.0" encoding="utf-8"?>
-<p:sldLayout xmlns:a="http://schemas.openxmlformats.org/drawingml/2006/main" xmlns:p="http://schemas.openxmlformats.org/presentationml/2006/main" xmlns:r="http://schemas.openxmlformats.org/officeDocument/2006/relationships" type="objAndTwoObj" preserve="1">
+<p:sldLayout xmlns:a="http://schemas.openxmlformats.org/drawingml/2006/main" xmlns:r="http://schemas.openxmlformats.org/officeDocument/2006/relationships" xmlns:p="http://schemas.openxmlformats.org/presentationml/2006/main" type="objAndTwoObj" preserve="1">
   <p:cSld name="Title Content and 2 Content">
     <p:spTree>
       <p:nvGrpSpPr>
@@ -953,7 +1102,8 @@
           </a:prstGeom>
         </p:spPr>
         <p:txBody>
-          <a:bodyPr lIns="0" rIns="0" tIns="0" bIns="0" anchor="ctr"/>
+          <a:bodyPr lIns="0" tIns="0" rIns="0" bIns="0" anchor="ctr"/>
+          <a:lstStyle/>
           <a:p>
             <a:pPr algn="ctr"/>
             <a:endParaRPr/>
@@ -980,7 +1130,8 @@
           </a:prstGeom>
         </p:spPr>
         <p:txBody>
-          <a:bodyPr lIns="0" rIns="0" tIns="0" bIns="0"/>
+          <a:bodyPr lIns="0" tIns="0" rIns="0" bIns="0"/>
+          <a:lstStyle/>
           <a:p>
             <a:endParaRPr/>
           </a:p>
@@ -1006,7 +1157,8 @@
           </a:prstGeom>
         </p:spPr>
         <p:txBody>
-          <a:bodyPr lIns="0" rIns="0" tIns="0" bIns="0"/>
+          <a:bodyPr lIns="0" tIns="0" rIns="0" bIns="0"/>
+          <a:lstStyle/>
           <a:p>
             <a:endParaRPr/>
           </a:p>
@@ -1032,7 +1184,8 @@
           </a:prstGeom>
         </p:spPr>
         <p:txBody>
-          <a:bodyPr lIns="0" rIns="0" tIns="0" bIns="0"/>
+          <a:bodyPr lIns="0" tIns="0" rIns="0" bIns="0"/>
+          <a:lstStyle/>
           <a:p>
             <a:endParaRPr/>
           </a:p>
@@ -1040,11 +1193,14 @@
       </p:sp>
     </p:spTree>
   </p:cSld>
+  <p:clrMapOvr>
+    <a:masterClrMapping/>
+  </p:clrMapOvr>
 </p:sldLayout>
 </file>
 
 <file path=ppt/slideLayouts/slideLayout9.xml><?xml version="1.0" encoding="utf-8"?>
-<p:sldLayout xmlns:a="http://schemas.openxmlformats.org/drawingml/2006/main" xmlns:p="http://schemas.openxmlformats.org/presentationml/2006/main" xmlns:r="http://schemas.openxmlformats.org/officeDocument/2006/relationships" type="twoObjOverTx" preserve="1">
+<p:sldLayout xmlns:a="http://schemas.openxmlformats.org/drawingml/2006/main" xmlns:r="http://schemas.openxmlformats.org/officeDocument/2006/relationships" xmlns:p="http://schemas.openxmlformats.org/presentationml/2006/main" type="twoObjOverTx" preserve="1">
   <p:cSld name="Title, 2 Content over Content">
     <p:spTree>
       <p:nvGrpSpPr>
@@ -1080,7 +1236,8 @@
           </a:prstGeom>
         </p:spPr>
         <p:txBody>
-          <a:bodyPr lIns="0" rIns="0" tIns="0" bIns="0" anchor="ctr"/>
+          <a:bodyPr lIns="0" tIns="0" rIns="0" bIns="0" anchor="ctr"/>
+          <a:lstStyle/>
           <a:p>
             <a:pPr algn="ctr"/>
             <a:endParaRPr/>
@@ -1107,7 +1264,8 @@
           </a:prstGeom>
         </p:spPr>
         <p:txBody>
-          <a:bodyPr lIns="0" rIns="0" tIns="0" bIns="0"/>
+          <a:bodyPr lIns="0" tIns="0" rIns="0" bIns="0"/>
+          <a:lstStyle/>
           <a:p>
             <a:endParaRPr/>
           </a:p>
@@ -1133,7 +1291,8 @@
           </a:prstGeom>
         </p:spPr>
         <p:txBody>
-          <a:bodyPr lIns="0" rIns="0" tIns="0" bIns="0"/>
+          <a:bodyPr lIns="0" tIns="0" rIns="0" bIns="0"/>
+          <a:lstStyle/>
           <a:p>
             <a:endParaRPr/>
           </a:p>
@@ -1159,7 +1318,8 @@
           </a:prstGeom>
         </p:spPr>
         <p:txBody>
-          <a:bodyPr lIns="0" rIns="0" tIns="0" bIns="0"/>
+          <a:bodyPr lIns="0" tIns="0" rIns="0" bIns="0"/>
+          <a:lstStyle/>
           <a:p>
             <a:endParaRPr/>
           </a:p>
@@ -1167,17 +1327,21 @@
       </p:sp>
     </p:spTree>
   </p:cSld>
+  <p:clrMapOvr>
+    <a:masterClrMapping/>
+  </p:clrMapOvr>
 </p:sldLayout>
 </file>
 
 <file path=ppt/slideMasters/slideMaster1.xml><?xml version="1.0" encoding="utf-8"?>
-<p:sldMaster xmlns:a="http://schemas.openxmlformats.org/drawingml/2006/main" xmlns:p="http://schemas.openxmlformats.org/presentationml/2006/main" xmlns:r="http://schemas.openxmlformats.org/officeDocument/2006/relationships">
+<p:sldMaster xmlns:a="http://schemas.openxmlformats.org/drawingml/2006/main" xmlns:r="http://schemas.openxmlformats.org/officeDocument/2006/relationships" xmlns:p="http://schemas.openxmlformats.org/presentationml/2006/main">
   <p:cSld>
     <p:bg>
       <p:bgPr>
         <a:solidFill>
-          <a:srgbClr val="ffffff"/>
+          <a:srgbClr val="FFFFFF"/>
         </a:solidFill>
+        <a:effectLst/>
       </p:bgPr>
     </p:bg>
     <p:spTree>
@@ -1196,7 +1360,7 @@
       </p:grpSpPr>
       <p:sp>
         <p:nvSpPr>
-          <p:cNvPr id="0" name="PlaceHolder 1"/>
+          <p:cNvPr id="2" name="PlaceHolder 1"/>
           <p:cNvSpPr>
             <a:spLocks noGrp="1"/>
           </p:cNvSpPr>
@@ -1214,7 +1378,8 @@
           </a:prstGeom>
         </p:spPr>
         <p:txBody>
-          <a:bodyPr lIns="0" rIns="0" tIns="0" bIns="0" anchor="ctr"/>
+          <a:bodyPr lIns="0" tIns="0" rIns="0" bIns="0" anchor="ctr"/>
+          <a:lstStyle/>
           <a:p>
             <a:r>
               <a:rPr lang="en-GB">
@@ -1228,7 +1393,7 @@
       </p:sp>
       <p:sp>
         <p:nvSpPr>
-          <p:cNvPr id="1" name="PlaceHolder 2"/>
+          <p:cNvPr id="3" name="PlaceHolder 2"/>
           <p:cNvSpPr>
             <a:spLocks noGrp="1"/>
           </p:cNvSpPr>
@@ -1246,7 +1411,8 @@
           </a:prstGeom>
         </p:spPr>
         <p:txBody>
-          <a:bodyPr lIns="0" rIns="0" tIns="0" bIns="0"/>
+          <a:bodyPr lIns="0" tIns="0" rIns="0" bIns="0"/>
+          <a:lstStyle/>
           <a:p>
             <a:pPr>
               <a:buSzPct val="45000"/>
@@ -1349,32 +1515,38 @@
       </p:sp>
     </p:spTree>
   </p:cSld>
-  <p:clrMap bg1="lt1" bg2="lt2" tx1="dk1" tx2="dk2" accent1="accent1" accent2="accent2" accent3="accent3" accent4="accent4" accent5="accent5" accent6="accent6" hlink="hlink" folHlink="folHlink"/>
+  <p:clrMap bg1="lt1" tx1="dk1" bg2="lt2" tx2="dk2" accent1="accent1" accent2="accent2" accent3="accent3" accent4="accent4" accent5="accent5" accent6="accent6" hlink="hlink" folHlink="folHlink"/>
   <p:sldLayoutIdLst>
-    <p:sldLayoutId id="2147483649" r:id="rId2"/>
-    <p:sldLayoutId id="2147483650" r:id="rId3"/>
-    <p:sldLayoutId id="2147483651" r:id="rId4"/>
-    <p:sldLayoutId id="2147483652" r:id="rId5"/>
-    <p:sldLayoutId id="2147483653" r:id="rId6"/>
-    <p:sldLayoutId id="2147483654" r:id="rId7"/>
-    <p:sldLayoutId id="2147483655" r:id="rId8"/>
-    <p:sldLayoutId id="2147483656" r:id="rId9"/>
-    <p:sldLayoutId id="2147483657" r:id="rId10"/>
-    <p:sldLayoutId id="2147483658" r:id="rId11"/>
-    <p:sldLayoutId id="2147483659" r:id="rId12"/>
-    <p:sldLayoutId id="2147483660" r:id="rId13"/>
+    <p:sldLayoutId id="2147483649" r:id="rId1"/>
+    <p:sldLayoutId id="2147483650" r:id="rId2"/>
+    <p:sldLayoutId id="2147483651" r:id="rId3"/>
+    <p:sldLayoutId id="2147483652" r:id="rId4"/>
+    <p:sldLayoutId id="2147483653" r:id="rId5"/>
+    <p:sldLayoutId id="2147483654" r:id="rId6"/>
+    <p:sldLayoutId id="2147483655" r:id="rId7"/>
+    <p:sldLayoutId id="2147483656" r:id="rId8"/>
+    <p:sldLayoutId id="2147483657" r:id="rId9"/>
+    <p:sldLayoutId id="2147483658" r:id="rId10"/>
+    <p:sldLayoutId id="2147483659" r:id="rId11"/>
+    <p:sldLayoutId id="2147483660" r:id="rId12"/>
   </p:sldLayoutIdLst>
+  <p:txStyles>
+    <p:titleStyle/>
+    <p:bodyStyle/>
+    <p:otherStyle/>
+  </p:txStyles>
 </p:sldMaster>
 </file>
 
 <file path=ppt/slides/slide1.xml><?xml version="1.0" encoding="utf-8"?>
-<p:sld xmlns:a="http://schemas.openxmlformats.org/drawingml/2006/main" xmlns:p="http://schemas.openxmlformats.org/presentationml/2006/main" xmlns:r="http://schemas.openxmlformats.org/officeDocument/2006/relationships">
+<p:sld xmlns:a="http://schemas.openxmlformats.org/drawingml/2006/main" xmlns:r="http://schemas.openxmlformats.org/officeDocument/2006/relationships" xmlns:p="http://schemas.openxmlformats.org/presentationml/2006/main">
   <p:cSld>
     <p:bg>
       <p:bgPr>
         <a:solidFill>
-          <a:srgbClr val="ffffff"/>
+          <a:srgbClr val="FFFFFF"/>
         </a:solidFill>
+        <a:effectLst/>
       </p:bgPr>
     </p:bg>
     <p:spTree>
@@ -1393,14 +1565,62 @@
       </p:grpSpPr>
       <p:sp>
         <p:nvSpPr>
-          <p:cNvPr id="36" name="CustomShape 1"/>
+          <p:cNvPr id="39" name="CustomShape 4"/>
           <p:cNvSpPr/>
           <p:nvPr/>
         </p:nvSpPr>
         <p:spPr>
           <a:xfrm>
-            <a:off x="2176200" y="2250360"/>
-            <a:ext cx="2591280" cy="2077560"/>
+            <a:off x="1744200" y="3526200"/>
+            <a:ext cx="430920" cy="360"/>
+          </a:xfrm>
+          <a:prstGeom prst="straightConnector1">
+            <a:avLst/>
+          </a:prstGeom>
+          <a:noFill/>
+          <a:ln w="38160">
+            <a:solidFill>
+              <a:srgbClr val="4F81BD"/>
+            </a:solidFill>
+            <a:round/>
+            <a:tailEnd type="arrow" w="med" len="med"/>
+          </a:ln>
+        </p:spPr>
+      </p:sp>
+      <p:sp>
+        <p:nvSpPr>
+          <p:cNvPr id="40" name="CustomShape 5"/>
+          <p:cNvSpPr/>
+          <p:nvPr/>
+        </p:nvSpPr>
+        <p:spPr>
+          <a:xfrm>
+            <a:off x="2500298" y="3356761"/>
+            <a:ext cx="2786082" cy="70238"/>
+          </a:xfrm>
+          <a:prstGeom prst="straightConnector1">
+            <a:avLst/>
+          </a:prstGeom>
+          <a:noFill/>
+          <a:ln w="38160">
+            <a:solidFill>
+              <a:srgbClr val="4F81BD"/>
+            </a:solidFill>
+            <a:round/>
+            <a:tailEnd type="arrow" w="med" len="med"/>
+          </a:ln>
+        </p:spPr>
+      </p:sp>
+      <p:sp>
+        <p:nvSpPr>
+          <p:cNvPr id="41" name="CustomShape 6"/>
+          <p:cNvSpPr/>
+          <p:nvPr/>
+        </p:nvSpPr>
+        <p:spPr>
+          <a:xfrm>
+            <a:off x="5164200" y="4891680"/>
+            <a:ext cx="1871280" cy="1415880"/>
           </a:xfrm>
           <a:prstGeom prst="cube">
             <a:avLst>
@@ -1408,17 +1628,18 @@
             </a:avLst>
           </a:prstGeom>
           <a:solidFill>
-            <a:srgbClr val="4f81bd"/>
+            <a:srgbClr val="4F81BD"/>
           </a:solidFill>
           <a:ln w="25560">
             <a:solidFill>
-              <a:srgbClr val="3a5f8b"/>
+              <a:srgbClr val="3A5F8B"/>
             </a:solidFill>
             <a:round/>
           </a:ln>
         </p:spPr>
         <p:txBody>
-          <a:bodyPr lIns="90000" rIns="90000" tIns="45000" bIns="45000" anchor="ctr"/>
+          <a:bodyPr lIns="90000" tIns="45000" rIns="90000" bIns="45000" anchor="ctr"/>
+          <a:lstStyle/>
           <a:p>
             <a:pPr algn="ctr">
               <a:lnSpc>
@@ -1428,11 +1649,11 @@
             <a:r>
               <a:rPr lang="en-GB" sz="4000">
                 <a:solidFill>
-                  <a:srgbClr val="ffffff"/>
+                  <a:srgbClr val="FFFFFF"/>
                 </a:solidFill>
                 <a:latin typeface="Calibri"/>
               </a:rPr>
-              <a:t>CLAHE</a:t>
+              <a:t>SSIM</a:t>
             </a:r>
             <a:endParaRPr/>
           </a:p>
@@ -1440,32 +1661,541 @@
       </p:sp>
       <p:sp>
         <p:nvSpPr>
-          <p:cNvPr id="37" name="CustomShape 2"/>
+          <p:cNvPr id="42" name="CustomShape 7"/>
           <p:cNvSpPr/>
           <p:nvPr/>
         </p:nvSpPr>
         <p:spPr>
-          <a:xfrm>
-            <a:off x="159840" y="2723040"/>
-            <a:ext cx="1582920" cy="1604880"/>
+          <a:xfrm rot="5400000" flipV="1">
+            <a:off x="2214546" y="2856695"/>
+            <a:ext cx="1714512" cy="4286280"/>
+          </a:xfrm>
+          <a:prstGeom prst="bentConnector2">
+            <a:avLst/>
+          </a:prstGeom>
+          <a:noFill/>
+          <a:ln w="38160">
+            <a:solidFill>
+              <a:srgbClr val="4F81BD"/>
+            </a:solidFill>
+            <a:round/>
+            <a:tailEnd type="arrow" w="med" len="med"/>
+          </a:ln>
+        </p:spPr>
+      </p:sp>
+      <p:sp>
+        <p:nvSpPr>
+          <p:cNvPr id="43" name="CustomShape 8"/>
+          <p:cNvSpPr/>
+          <p:nvPr/>
+        </p:nvSpPr>
+        <p:spPr>
+          <a:xfrm>
+            <a:off x="7452360" y="3124800"/>
+            <a:ext cx="1582920" cy="801720"/>
           </a:xfrm>
           <a:prstGeom prst="roundRect">
             <a:avLst>
               <a:gd name="adj" fmla="val 16667"/>
             </a:avLst>
           </a:prstGeom>
+          <a:gradFill>
+            <a:gsLst>
+              <a:gs pos="0">
+                <a:srgbClr val="BFECFF"/>
+              </a:gs>
+              <a:gs pos="100000">
+                <a:srgbClr val="E6F7FF"/>
+              </a:gs>
+            </a:gsLst>
+            <a:lin ang="16200000"/>
+          </a:gradFill>
+          <a:ln w="9360">
+            <a:solidFill>
+              <a:srgbClr val="46AAC4"/>
+            </a:solidFill>
+            <a:round/>
+          </a:ln>
+        </p:spPr>
+        <p:txBody>
+          <a:bodyPr lIns="90000" tIns="45000" rIns="90000" bIns="45000" anchor="ctr"/>
+          <a:lstStyle/>
+          <a:p>
+            <a:pPr algn="ctr">
+              <a:lnSpc>
+                <a:spcPct val="100000"/>
+              </a:lnSpc>
+            </a:pPr>
+            <a:r>
+              <a:rPr lang="en-GB">
+                <a:solidFill>
+                  <a:srgbClr val="000000"/>
+                </a:solidFill>
+                <a:latin typeface="Calibri"/>
+              </a:rPr>
+              <a:t>Entropy</a:t>
+            </a:r>
+            <a:endParaRPr/>
+          </a:p>
+        </p:txBody>
+      </p:sp>
+      <p:sp>
+        <p:nvSpPr>
+          <p:cNvPr id="44" name="CustomShape 9"/>
+          <p:cNvSpPr/>
+          <p:nvPr/>
+        </p:nvSpPr>
+        <p:spPr>
+          <a:xfrm>
+            <a:off x="4552200" y="6852600"/>
+            <a:ext cx="3167280" cy="1945800"/>
+          </a:xfrm>
+          <a:prstGeom prst="cube">
+            <a:avLst>
+              <a:gd name="adj" fmla="val 25000"/>
+            </a:avLst>
+          </a:prstGeom>
           <a:solidFill>
-            <a:srgbClr val="dce6f2"/>
+            <a:srgbClr val="4F81BD"/>
           </a:solidFill>
           <a:ln w="25560">
             <a:solidFill>
-              <a:srgbClr val="3a5f8b"/>
+              <a:srgbClr val="3A5F8B"/>
             </a:solidFill>
             <a:round/>
           </a:ln>
         </p:spPr>
         <p:txBody>
-          <a:bodyPr lIns="90000" rIns="90000" tIns="45000" bIns="45000" anchor="ctr"/>
+          <a:bodyPr lIns="90000" tIns="45000" rIns="90000" bIns="45000" anchor="ctr"/>
+          <a:lstStyle/>
+          <a:p>
+            <a:pPr algn="ctr">
+              <a:lnSpc>
+                <a:spcPct val="100000"/>
+              </a:lnSpc>
+            </a:pPr>
+            <a:r>
+              <a:rPr lang="en-GB" sz="2500">
+                <a:solidFill>
+                  <a:srgbClr val="FFFFFF"/>
+                </a:solidFill>
+                <a:latin typeface="Calibri"/>
+              </a:rPr>
+              <a:t>Evaluation Function (Fitness)</a:t>
+            </a:r>
+            <a:endParaRPr/>
+          </a:p>
+        </p:txBody>
+      </p:sp>
+      <p:sp>
+        <p:nvSpPr>
+          <p:cNvPr id="45" name="CustomShape 10"/>
+          <p:cNvSpPr/>
+          <p:nvPr/>
+        </p:nvSpPr>
+        <p:spPr>
+          <a:xfrm>
+            <a:off x="6892920" y="3526200"/>
+            <a:ext cx="558360" cy="360"/>
+          </a:xfrm>
+          <a:prstGeom prst="straightConnector1">
+            <a:avLst/>
+          </a:prstGeom>
+          <a:noFill/>
+          <a:ln w="38160">
+            <a:solidFill>
+              <a:srgbClr val="4F81BD"/>
+            </a:solidFill>
+            <a:round/>
+            <a:tailEnd type="arrow" w="med" len="med"/>
+          </a:ln>
+        </p:spPr>
+      </p:sp>
+      <p:sp>
+        <p:nvSpPr>
+          <p:cNvPr id="46" name="CustomShape 11"/>
+          <p:cNvSpPr/>
+          <p:nvPr/>
+        </p:nvSpPr>
+        <p:spPr>
+          <a:xfrm>
+            <a:off x="5940000" y="6309000"/>
+            <a:ext cx="360" cy="542520"/>
+          </a:xfrm>
+          <a:prstGeom prst="straightConnector1">
+            <a:avLst/>
+          </a:prstGeom>
+          <a:noFill/>
+          <a:ln w="38160">
+            <a:solidFill>
+              <a:srgbClr val="4F81BD"/>
+            </a:solidFill>
+            <a:round/>
+            <a:tailEnd type="arrow" w="med" len="med"/>
+          </a:ln>
+        </p:spPr>
+      </p:sp>
+      <p:sp>
+        <p:nvSpPr>
+          <p:cNvPr id="47" name="CustomShape 12"/>
+          <p:cNvSpPr/>
+          <p:nvPr/>
+        </p:nvSpPr>
+        <p:spPr>
+          <a:xfrm rot="5400000">
+            <a:off x="5880240" y="5751720"/>
+            <a:ext cx="4188240" cy="539640"/>
+          </a:xfrm>
+          <a:prstGeom prst="bentConnector3">
+            <a:avLst>
+              <a:gd name="adj1" fmla="val 99875"/>
+            </a:avLst>
+          </a:prstGeom>
+          <a:noFill/>
+          <a:ln w="38160">
+            <a:solidFill>
+              <a:srgbClr val="4F81BD"/>
+            </a:solidFill>
+            <a:round/>
+            <a:tailEnd type="arrow" w="med" len="med"/>
+          </a:ln>
+        </p:spPr>
+      </p:sp>
+      <p:sp>
+        <p:nvSpPr>
+          <p:cNvPr id="48" name="CustomShape 13"/>
+          <p:cNvSpPr/>
+          <p:nvPr/>
+        </p:nvSpPr>
+        <p:spPr>
+          <a:xfrm flipH="1">
+            <a:off x="3470400" y="1619640"/>
+            <a:ext cx="360" cy="629280"/>
+          </a:xfrm>
+          <a:prstGeom prst="straightConnector1">
+            <a:avLst/>
+          </a:prstGeom>
+          <a:noFill/>
+          <a:ln w="38160">
+            <a:solidFill>
+              <a:srgbClr val="4F81BD"/>
+            </a:solidFill>
+            <a:round/>
+            <a:tailEnd type="arrow" w="med" len="med"/>
+          </a:ln>
+        </p:spPr>
+      </p:sp>
+      <p:sp>
+        <p:nvSpPr>
+          <p:cNvPr id="49" name="CustomShape 14"/>
+          <p:cNvSpPr/>
+          <p:nvPr/>
+        </p:nvSpPr>
+        <p:spPr>
+          <a:xfrm>
+            <a:off x="2760480" y="1065960"/>
+            <a:ext cx="1378800" cy="660240"/>
+          </a:xfrm>
+          <a:prstGeom prst="can">
+            <a:avLst>
+              <a:gd name="adj" fmla="val 25000"/>
+            </a:avLst>
+          </a:prstGeom>
+          <a:gradFill>
+            <a:gsLst>
+              <a:gs pos="0">
+                <a:srgbClr val="BFECFF"/>
+              </a:gs>
+              <a:gs pos="100000">
+                <a:srgbClr val="E6F7FF"/>
+              </a:gs>
+            </a:gsLst>
+            <a:lin ang="16200000"/>
+          </a:gradFill>
+          <a:ln w="9360">
+            <a:solidFill>
+              <a:srgbClr val="46AAC4"/>
+            </a:solidFill>
+            <a:round/>
+          </a:ln>
+        </p:spPr>
+        <p:txBody>
+          <a:bodyPr lIns="90000" tIns="45000" rIns="90000" bIns="45000" anchor="ctr"/>
+          <a:lstStyle/>
+          <a:p>
+            <a:pPr algn="ctr">
+              <a:lnSpc>
+                <a:spcPct val="100000"/>
+              </a:lnSpc>
+            </a:pPr>
+            <a:r>
+              <a:rPr lang="en-GB" i="1" dirty="0" err="1" smtClean="0">
+                <a:solidFill>
+                  <a:srgbClr val="000000"/>
+                </a:solidFill>
+                <a:latin typeface="Calibri"/>
+              </a:rPr>
+              <a:t>ClipL</a:t>
+            </a:r>
+            <a:r>
+              <a:rPr lang="en-GB" i="1" dirty="0" smtClean="0">
+                <a:solidFill>
+                  <a:srgbClr val="000000"/>
+                </a:solidFill>
+                <a:latin typeface="Calibri"/>
+              </a:rPr>
+              <a:t>}</a:t>
+            </a:r>
+            <a:r>
+              <a:rPr lang="en-GB" i="1" dirty="0" err="1" smtClean="0">
+                <a:solidFill>
+                  <a:srgbClr val="000000"/>
+                </a:solidFill>
+                <a:latin typeface="Calibri"/>
+              </a:rPr>
+              <a:t>imit</a:t>
+            </a:r>
+            <a:endParaRPr/>
+          </a:p>
+        </p:txBody>
+      </p:sp>
+      <p:sp>
+        <p:nvSpPr>
+          <p:cNvPr id="50" name="CustomShape 15"/>
+          <p:cNvSpPr/>
+          <p:nvPr/>
+        </p:nvSpPr>
+        <p:spPr>
+          <a:xfrm>
+            <a:off x="2760480" y="582480"/>
+            <a:ext cx="1378800" cy="660240"/>
+          </a:xfrm>
+          <a:prstGeom prst="can">
+            <a:avLst>
+              <a:gd name="adj" fmla="val 25000"/>
+            </a:avLst>
+          </a:prstGeom>
+          <a:gradFill>
+            <a:gsLst>
+              <a:gs pos="0">
+                <a:srgbClr val="BFECFF"/>
+              </a:gs>
+              <a:gs pos="100000">
+                <a:srgbClr val="E6F7FF"/>
+              </a:gs>
+            </a:gsLst>
+            <a:lin ang="16200000"/>
+          </a:gradFill>
+          <a:ln w="9360">
+            <a:solidFill>
+              <a:srgbClr val="46AAC4"/>
+            </a:solidFill>
+            <a:round/>
+          </a:ln>
+        </p:spPr>
+        <p:txBody>
+          <a:bodyPr lIns="90000" tIns="45000" rIns="90000" bIns="45000" anchor="ctr"/>
+          <a:lstStyle/>
+          <a:p>
+            <a:pPr algn="ctr">
+              <a:lnSpc>
+                <a:spcPct val="100000"/>
+              </a:lnSpc>
+            </a:pPr>
+            <a:r>
+              <a:rPr lang="en-GB" i="1" dirty="0" err="1">
+                <a:solidFill>
+                  <a:srgbClr val="000000"/>
+                </a:solidFill>
+                <a:latin typeface="Calibri"/>
+              </a:rPr>
+              <a:t>Ry</a:t>
+            </a:r>
+            <a:endParaRPr/>
+          </a:p>
+        </p:txBody>
+      </p:sp>
+      <p:sp>
+        <p:nvSpPr>
+          <p:cNvPr id="51" name="CustomShape 16"/>
+          <p:cNvSpPr/>
+          <p:nvPr/>
+        </p:nvSpPr>
+        <p:spPr>
+          <a:xfrm>
+            <a:off x="2760480" y="70560"/>
+            <a:ext cx="1378800" cy="660240"/>
+          </a:xfrm>
+          <a:prstGeom prst="can">
+            <a:avLst>
+              <a:gd name="adj" fmla="val 25000"/>
+            </a:avLst>
+          </a:prstGeom>
+          <a:gradFill>
+            <a:gsLst>
+              <a:gs pos="0">
+                <a:srgbClr val="BFECFF"/>
+              </a:gs>
+              <a:gs pos="100000">
+                <a:srgbClr val="E6F7FF"/>
+              </a:gs>
+            </a:gsLst>
+            <a:lin ang="16200000"/>
+          </a:gradFill>
+          <a:ln w="9360">
+            <a:solidFill>
+              <a:srgbClr val="46AAC4"/>
+            </a:solidFill>
+            <a:round/>
+          </a:ln>
+        </p:spPr>
+        <p:txBody>
+          <a:bodyPr lIns="90000" tIns="45000" rIns="90000" bIns="45000" anchor="ctr"/>
+          <a:lstStyle/>
+          <a:p>
+            <a:pPr algn="ctr">
+              <a:lnSpc>
+                <a:spcPct val="100000"/>
+              </a:lnSpc>
+            </a:pPr>
+            <a:r>
+              <a:rPr lang="en-GB" i="1">
+                <a:solidFill>
+                  <a:srgbClr val="000000"/>
+                </a:solidFill>
+                <a:latin typeface="Calibri"/>
+              </a:rPr>
+              <a:t>Rx</a:t>
+            </a:r>
+            <a:endParaRPr/>
+          </a:p>
+        </p:txBody>
+      </p:sp>
+      <p:sp>
+        <p:nvSpPr>
+          <p:cNvPr id="52" name="CustomShape 17"/>
+          <p:cNvSpPr/>
+          <p:nvPr/>
+        </p:nvSpPr>
+        <p:spPr>
+          <a:xfrm>
+            <a:off x="448560" y="6924600"/>
+            <a:ext cx="3167280" cy="1945800"/>
+          </a:xfrm>
+          <a:prstGeom prst="cube">
+            <a:avLst>
+              <a:gd name="adj" fmla="val 25000"/>
+            </a:avLst>
+          </a:prstGeom>
+          <a:solidFill>
+            <a:srgbClr val="4F81BD"/>
+          </a:solidFill>
+          <a:ln w="25560">
+            <a:solidFill>
+              <a:srgbClr val="3A5F8B"/>
+            </a:solidFill>
+            <a:round/>
+          </a:ln>
+        </p:spPr>
+        <p:txBody>
+          <a:bodyPr lIns="90000" tIns="45000" rIns="90000" bIns="45000" anchor="ctr"/>
+          <a:lstStyle/>
+          <a:p>
+            <a:pPr algn="ctr">
+              <a:lnSpc>
+                <a:spcPct val="100000"/>
+              </a:lnSpc>
+            </a:pPr>
+            <a:r>
+              <a:rPr lang="en-GB" sz="2500">
+                <a:solidFill>
+                  <a:srgbClr val="FFFFFF"/>
+                </a:solidFill>
+                <a:latin typeface="Calibri"/>
+              </a:rPr>
+              <a:t>Pareto Set</a:t>
+            </a:r>
+            <a:endParaRPr/>
+          </a:p>
+        </p:txBody>
+      </p:sp>
+      <p:sp>
+        <p:nvSpPr>
+          <p:cNvPr id="53" name="CustomShape 18"/>
+          <p:cNvSpPr/>
+          <p:nvPr/>
+        </p:nvSpPr>
+        <p:spPr>
+          <a:xfrm flipH="1">
+            <a:off x="3615480" y="7884000"/>
+            <a:ext cx="934920" cy="360"/>
+          </a:xfrm>
+          <a:prstGeom prst="straightConnector1">
+            <a:avLst/>
+          </a:prstGeom>
+          <a:noFill/>
+          <a:ln w="38160">
+            <a:solidFill>
+              <a:srgbClr val="4F81BD"/>
+            </a:solidFill>
+            <a:round/>
+            <a:tailEnd type="arrow" w="med" len="med"/>
+          </a:ln>
+        </p:spPr>
+      </p:sp>
+      <p:sp>
+        <p:nvSpPr>
+          <p:cNvPr id="54" name="CustomShape 19"/>
+          <p:cNvSpPr/>
+          <p:nvPr/>
+        </p:nvSpPr>
+        <p:spPr>
+          <a:xfrm flipH="1">
+            <a:off x="6062040" y="4284000"/>
+            <a:ext cx="360" cy="629280"/>
+          </a:xfrm>
+          <a:prstGeom prst="straightConnector1">
+            <a:avLst/>
+          </a:prstGeom>
+          <a:noFill/>
+          <a:ln w="38160">
+            <a:solidFill>
+              <a:srgbClr val="4F81BD"/>
+            </a:solidFill>
+            <a:round/>
+            <a:tailEnd type="arrow" w="med" len="med"/>
+          </a:ln>
+        </p:spPr>
+      </p:sp>
+      <p:sp>
+        <p:nvSpPr>
+          <p:cNvPr id="37" name="CustomShape 2"/>
+          <p:cNvSpPr/>
+          <p:nvPr/>
+        </p:nvSpPr>
+        <p:spPr>
+          <a:xfrm>
+            <a:off x="159840" y="2723040"/>
+            <a:ext cx="1582920" cy="1604880"/>
+          </a:xfrm>
+          <a:prstGeom prst="roundRect">
+            <a:avLst>
+              <a:gd name="adj" fmla="val 16667"/>
+            </a:avLst>
+          </a:prstGeom>
+          <a:solidFill>
+            <a:srgbClr val="DCE6F2"/>
+          </a:solidFill>
+          <a:ln w="25560">
+            <a:solidFill>
+              <a:srgbClr val="3A5F8B"/>
+            </a:solidFill>
+            <a:round/>
+          </a:ln>
+        </p:spPr>
+        <p:txBody>
+          <a:bodyPr lIns="90000" tIns="45000" rIns="90000" bIns="45000" anchor="ctr"/>
+          <a:lstStyle/>
           <a:p>
             <a:pPr algn="ctr">
               <a:lnSpc>
@@ -1482,7 +2212,7 @@
               <a:t>Input Image </a:t>
             </a:r>
             <a:r>
-              <a:rPr i="1" lang="en-GB">
+              <a:rPr lang="en-GB" i="1">
                 <a:solidFill>
                   <a:srgbClr val="000000"/>
                 </a:solidFill>
@@ -1496,6 +2226,54 @@
       </p:sp>
       <p:sp>
         <p:nvSpPr>
+          <p:cNvPr id="36" name="CustomShape 1"/>
+          <p:cNvSpPr/>
+          <p:nvPr/>
+        </p:nvSpPr>
+        <p:spPr>
+          <a:xfrm>
+            <a:off x="2176200" y="2250360"/>
+            <a:ext cx="2591280" cy="2077560"/>
+          </a:xfrm>
+          <a:prstGeom prst="cube">
+            <a:avLst>
+              <a:gd name="adj" fmla="val 25000"/>
+            </a:avLst>
+          </a:prstGeom>
+          <a:solidFill>
+            <a:srgbClr val="4F81BD"/>
+          </a:solidFill>
+          <a:ln w="25560">
+            <a:solidFill>
+              <a:srgbClr val="3A5F8B"/>
+            </a:solidFill>
+            <a:round/>
+          </a:ln>
+        </p:spPr>
+        <p:txBody>
+          <a:bodyPr lIns="90000" tIns="45000" rIns="90000" bIns="45000" anchor="ctr"/>
+          <a:lstStyle/>
+          <a:p>
+            <a:pPr algn="ctr">
+              <a:lnSpc>
+                <a:spcPct val="100000"/>
+              </a:lnSpc>
+            </a:pPr>
+            <a:r>
+              <a:rPr lang="en-GB" sz="4000">
+                <a:solidFill>
+                  <a:srgbClr val="FFFFFF"/>
+                </a:solidFill>
+                <a:latin typeface="Calibri"/>
+              </a:rPr>
+              <a:t>CLAHE</a:t>
+            </a:r>
+            <a:endParaRPr/>
+          </a:p>
+        </p:txBody>
+      </p:sp>
+      <p:sp>
+        <p:nvSpPr>
           <p:cNvPr id="38" name="CustomShape 3"/>
           <p:cNvSpPr/>
           <p:nvPr/>
@@ -1511,17 +2289,18 @@
             </a:avLst>
           </a:prstGeom>
           <a:solidFill>
-            <a:srgbClr val="d99694"/>
+            <a:srgbClr val="D99694"/>
           </a:solidFill>
           <a:ln w="25560">
             <a:solidFill>
-              <a:srgbClr val="3a5f8b"/>
+              <a:srgbClr val="3A5F8B"/>
             </a:solidFill>
             <a:round/>
           </a:ln>
         </p:spPr>
         <p:txBody>
-          <a:bodyPr lIns="90000" rIns="90000" tIns="45000" bIns="45000" anchor="ctr"/>
+          <a:bodyPr lIns="90000" tIns="45000" rIns="90000" bIns="45000" anchor="ctr"/>
+          <a:lstStyle/>
           <a:p>
             <a:pPr algn="ctr">
               <a:lnSpc>
@@ -1538,7 +2317,7 @@
               <a:t>Enhanced Image </a:t>
             </a:r>
             <a:r>
-              <a:rPr i="1" lang="en-GB">
+              <a:rPr lang="en-GB" i="1">
                 <a:solidFill>
                   <a:srgbClr val="000000"/>
                 </a:solidFill>
@@ -1552,585 +2331,79 @@
       </p:sp>
       <p:sp>
         <p:nvSpPr>
-          <p:cNvPr id="39" name="CustomShape 4"/>
+          <p:cNvPr id="21" name="Right Brace 20"/>
           <p:cNvSpPr/>
           <p:nvPr/>
         </p:nvSpPr>
         <p:spPr>
           <a:xfrm>
-            <a:off x="1744200" y="3526200"/>
-            <a:ext cx="430920" cy="360"/>
-          </a:xfrm>
-          <a:prstGeom prst="straightConnector1">
-            <a:avLst/>
-          </a:prstGeom>
-          <a:noFill/>
-          <a:ln w="38160">
-            <a:solidFill>
-              <a:srgbClr val="4f81bd"/>
-            </a:solidFill>
-            <a:round/>
-            <a:tailEnd len="med" type="arrow" w="med"/>
-          </a:ln>
-        </p:spPr>
-      </p:sp>
-      <p:sp>
-        <p:nvSpPr>
-          <p:cNvPr id="40" name="CustomShape 5"/>
-          <p:cNvSpPr/>
+            <a:off x="4143372" y="71438"/>
+            <a:ext cx="428628" cy="1713687"/>
+          </a:xfrm>
+          <a:prstGeom prst="rightBrace">
+            <a:avLst/>
+          </a:prstGeom>
+        </p:spPr>
+        <p:style>
+          <a:lnRef idx="1">
+            <a:schemeClr val="accent1"/>
+          </a:lnRef>
+          <a:fillRef idx="0">
+            <a:schemeClr val="accent1"/>
+          </a:fillRef>
+          <a:effectRef idx="0">
+            <a:schemeClr val="accent1"/>
+          </a:effectRef>
+          <a:fontRef idx="minor">
+            <a:schemeClr val="tx1"/>
+          </a:fontRef>
+        </p:style>
+        <p:txBody>
+          <a:bodyPr rtlCol="0" anchor="ctr"/>
+          <a:lstStyle/>
+          <a:p>
+            <a:pPr algn="ctr"/>
+            <a:endParaRPr lang="es-ES"/>
+          </a:p>
+        </p:txBody>
+      </p:sp>
+      <p:sp>
+        <p:nvSpPr>
+          <p:cNvPr id="22" name="TextBox 21"/>
+          <p:cNvSpPr txBox="1"/>
           <p:nvPr/>
         </p:nvSpPr>
         <p:spPr>
           <a:xfrm>
-            <a:off x="4840560" y="3526200"/>
-            <a:ext cx="466920" cy="360"/>
-          </a:xfrm>
-          <a:prstGeom prst="straightConnector1">
-            <a:avLst/>
-          </a:prstGeom>
-          <a:noFill/>
-          <a:ln w="38160">
-            <a:solidFill>
-              <a:srgbClr val="4f81bd"/>
-            </a:solidFill>
-            <a:round/>
-            <a:tailEnd len="med" type="arrow" w="med"/>
-          </a:ln>
-        </p:spPr>
-      </p:sp>
-      <p:sp>
-        <p:nvSpPr>
-          <p:cNvPr id="41" name="CustomShape 6"/>
-          <p:cNvSpPr/>
-          <p:nvPr/>
-        </p:nvSpPr>
-        <p:spPr>
-          <a:xfrm>
-            <a:off x="5164200" y="4891680"/>
-            <a:ext cx="1871280" cy="1415880"/>
-          </a:xfrm>
-          <a:prstGeom prst="cube">
-            <a:avLst>
-              <a:gd name="adj" fmla="val 25000"/>
-            </a:avLst>
+            <a:off x="4572000" y="713555"/>
+            <a:ext cx="2071702" cy="369332"/>
+          </a:xfrm>
+          <a:prstGeom prst="rect">
+            <a:avLst/>
           </a:prstGeom>
           <a:solidFill>
-            <a:srgbClr val="4f81bd"/>
+            <a:schemeClr val="bg1"/>
           </a:solidFill>
-          <a:ln w="25560">
-            <a:solidFill>
-              <a:srgbClr val="3a5f8b"/>
-            </a:solidFill>
-            <a:round/>
-          </a:ln>
-        </p:spPr>
-        <p:txBody>
-          <a:bodyPr lIns="90000" rIns="90000" tIns="45000" bIns="45000" anchor="ctr"/>
-          <a:p>
-            <a:pPr algn="ctr">
-              <a:lnSpc>
-                <a:spcPct val="100000"/>
-              </a:lnSpc>
-            </a:pPr>
+        </p:spPr>
+        <p:txBody>
+          <a:bodyPr wrap="square" rtlCol="0">
+            <a:spAutoFit/>
+          </a:bodyPr>
+          <a:lstStyle/>
+          <a:p>
             <a:r>
-              <a:rPr lang="en-GB" sz="4000">
-                <a:solidFill>
-                  <a:srgbClr val="ffffff"/>
-                </a:solidFill>
-                <a:latin typeface="Calibri"/>
-              </a:rPr>
-              <a:t>SSIM</a:t>
+              <a:rPr lang="es-ES" dirty="0" err="1" smtClean="0"/>
+              <a:t>Particle</a:t>
             </a:r>
-            <a:endParaRPr/>
-          </a:p>
-        </p:txBody>
-      </p:sp>
-      <p:sp>
-        <p:nvSpPr>
-          <p:cNvPr id="42" name="CustomShape 7"/>
-          <p:cNvSpPr/>
-          <p:nvPr/>
-        </p:nvSpPr>
-        <p:spPr>
-          <a:xfrm flipH="1" rot="5400000">
-            <a:off x="2297520" y="2965680"/>
-            <a:ext cx="1504080" cy="4228200"/>
-          </a:xfrm>
-          <a:prstGeom prst="bentConnector2">
-            <a:avLst/>
-          </a:prstGeom>
-          <a:noFill/>
-          <a:ln w="38160">
-            <a:solidFill>
-              <a:srgbClr val="4f81bd"/>
-            </a:solidFill>
-            <a:round/>
-            <a:tailEnd len="med" type="arrow" w="med"/>
-          </a:ln>
-        </p:spPr>
-      </p:sp>
-      <p:sp>
-        <p:nvSpPr>
-          <p:cNvPr id="43" name="CustomShape 8"/>
-          <p:cNvSpPr/>
-          <p:nvPr/>
-        </p:nvSpPr>
-        <p:spPr>
-          <a:xfrm>
-            <a:off x="7452360" y="3124800"/>
-            <a:ext cx="1582920" cy="801720"/>
-          </a:xfrm>
-          <a:prstGeom prst="roundRect">
-            <a:avLst>
-              <a:gd name="adj" fmla="val 16667"/>
-            </a:avLst>
-          </a:prstGeom>
-          <a:gradFill>
-            <a:gsLst>
-              <a:gs pos="0">
-                <a:srgbClr val="bfecff"/>
-              </a:gs>
-              <a:gs pos="100000">
-                <a:srgbClr val="e6f7ff"/>
-              </a:gs>
-            </a:gsLst>
-            <a:lin ang="16200000"/>
-          </a:gradFill>
-          <a:ln w="9360">
-            <a:solidFill>
-              <a:srgbClr val="46aac4"/>
-            </a:solidFill>
-            <a:round/>
-          </a:ln>
-        </p:spPr>
-        <p:txBody>
-          <a:bodyPr lIns="90000" rIns="90000" tIns="45000" bIns="45000" anchor="ctr"/>
-          <a:p>
-            <a:pPr algn="ctr">
-              <a:lnSpc>
-                <a:spcPct val="100000"/>
-              </a:lnSpc>
-            </a:pPr>
-            <a:r>
-              <a:rPr lang="en-GB">
-                <a:solidFill>
-                  <a:srgbClr val="000000"/>
-                </a:solidFill>
-                <a:latin typeface="Calibri"/>
-              </a:rPr>
-              <a:t>Entropy</a:t>
-            </a:r>
-            <a:endParaRPr/>
-          </a:p>
-        </p:txBody>
-      </p:sp>
-      <p:sp>
-        <p:nvSpPr>
-          <p:cNvPr id="44" name="CustomShape 9"/>
-          <p:cNvSpPr/>
-          <p:nvPr/>
-        </p:nvSpPr>
-        <p:spPr>
-          <a:xfrm>
-            <a:off x="4552200" y="6852600"/>
-            <a:ext cx="3167280" cy="1945800"/>
-          </a:xfrm>
-          <a:prstGeom prst="cube">
-            <a:avLst>
-              <a:gd name="adj" fmla="val 25000"/>
-            </a:avLst>
-          </a:prstGeom>
-          <a:solidFill>
-            <a:srgbClr val="4f81bd"/>
-          </a:solidFill>
-          <a:ln w="25560">
-            <a:solidFill>
-              <a:srgbClr val="3a5f8b"/>
-            </a:solidFill>
-            <a:round/>
-          </a:ln>
-        </p:spPr>
-        <p:txBody>
-          <a:bodyPr lIns="90000" rIns="90000" tIns="45000" bIns="45000" anchor="ctr"/>
-          <a:p>
-            <a:pPr algn="ctr">
-              <a:lnSpc>
-                <a:spcPct val="100000"/>
-              </a:lnSpc>
-            </a:pPr>
-            <a:r>
-              <a:rPr lang="en-GB" sz="2500">
-                <a:solidFill>
-                  <a:srgbClr val="ffffff"/>
-                </a:solidFill>
-                <a:latin typeface="Calibri"/>
-              </a:rPr>
-              <a:t>Evaluation Function (Fitness)</a:t>
-            </a:r>
-            <a:endParaRPr/>
-          </a:p>
-        </p:txBody>
-      </p:sp>
-      <p:sp>
-        <p:nvSpPr>
-          <p:cNvPr id="45" name="CustomShape 10"/>
-          <p:cNvSpPr/>
-          <p:nvPr/>
-        </p:nvSpPr>
-        <p:spPr>
-          <a:xfrm>
-            <a:off x="6892920" y="3526200"/>
-            <a:ext cx="558360" cy="360"/>
-          </a:xfrm>
-          <a:prstGeom prst="straightConnector1">
-            <a:avLst/>
-          </a:prstGeom>
-          <a:noFill/>
-          <a:ln w="38160">
-            <a:solidFill>
-              <a:srgbClr val="4f81bd"/>
-            </a:solidFill>
-            <a:round/>
-            <a:tailEnd len="med" type="arrow" w="med"/>
-          </a:ln>
-        </p:spPr>
-      </p:sp>
-      <p:sp>
-        <p:nvSpPr>
-          <p:cNvPr id="46" name="CustomShape 11"/>
-          <p:cNvSpPr/>
-          <p:nvPr/>
-        </p:nvSpPr>
-        <p:spPr>
-          <a:xfrm>
-            <a:off x="5940000" y="6309000"/>
-            <a:ext cx="360" cy="542520"/>
-          </a:xfrm>
-          <a:prstGeom prst="straightConnector1">
-            <a:avLst/>
-          </a:prstGeom>
-          <a:noFill/>
-          <a:ln w="38160">
-            <a:solidFill>
-              <a:srgbClr val="4f81bd"/>
-            </a:solidFill>
-            <a:round/>
-            <a:tailEnd len="med" type="arrow" w="med"/>
-          </a:ln>
-        </p:spPr>
-      </p:sp>
-      <p:sp>
-        <p:nvSpPr>
-          <p:cNvPr id="47" name="CustomShape 12"/>
-          <p:cNvSpPr/>
-          <p:nvPr/>
-        </p:nvSpPr>
-        <p:spPr>
-          <a:xfrm rot="5400000">
-            <a:off x="5880240" y="5751720"/>
-            <a:ext cx="4188240" cy="539640"/>
-          </a:xfrm>
-          <a:prstGeom prst="bentConnector3">
-            <a:avLst>
-              <a:gd name="adj1" fmla="val 99875"/>
-            </a:avLst>
-          </a:prstGeom>
-          <a:noFill/>
-          <a:ln w="38160">
-            <a:solidFill>
-              <a:srgbClr val="4f81bd"/>
-            </a:solidFill>
-            <a:round/>
-            <a:tailEnd len="med" type="arrow" w="med"/>
-          </a:ln>
-        </p:spPr>
-      </p:sp>
-      <p:sp>
-        <p:nvSpPr>
-          <p:cNvPr id="48" name="CustomShape 13"/>
-          <p:cNvSpPr/>
-          <p:nvPr/>
-        </p:nvSpPr>
-        <p:spPr>
-          <a:xfrm flipH="1">
-            <a:off x="3470400" y="1619640"/>
-            <a:ext cx="360" cy="629280"/>
-          </a:xfrm>
-          <a:prstGeom prst="straightConnector1">
-            <a:avLst/>
-          </a:prstGeom>
-          <a:noFill/>
-          <a:ln w="38160">
-            <a:solidFill>
-              <a:srgbClr val="4f81bd"/>
-            </a:solidFill>
-            <a:round/>
-            <a:tailEnd len="med" type="arrow" w="med"/>
-          </a:ln>
-        </p:spPr>
-      </p:sp>
-      <p:sp>
-        <p:nvSpPr>
-          <p:cNvPr id="49" name="CustomShape 14"/>
-          <p:cNvSpPr/>
-          <p:nvPr/>
-        </p:nvSpPr>
-        <p:spPr>
-          <a:xfrm>
-            <a:off x="2760480" y="1065960"/>
-            <a:ext cx="1378800" cy="660240"/>
-          </a:xfrm>
-          <a:prstGeom prst="can">
-            <a:avLst>
-              <a:gd name="adj" fmla="val 25000"/>
-            </a:avLst>
-          </a:prstGeom>
-          <a:gradFill>
-            <a:gsLst>
-              <a:gs pos="0">
-                <a:srgbClr val="bfecff"/>
-              </a:gs>
-              <a:gs pos="100000">
-                <a:srgbClr val="e6f7ff"/>
-              </a:gs>
-            </a:gsLst>
-            <a:lin ang="16200000"/>
-          </a:gradFill>
-          <a:ln w="9360">
-            <a:solidFill>
-              <a:srgbClr val="46aac4"/>
-            </a:solidFill>
-            <a:round/>
-          </a:ln>
-        </p:spPr>
-        <p:txBody>
-          <a:bodyPr lIns="90000" rIns="90000" tIns="45000" bIns="45000" anchor="ctr"/>
-          <a:p>
-            <a:pPr algn="ctr">
-              <a:lnSpc>
-                <a:spcPct val="100000"/>
-              </a:lnSpc>
-            </a:pPr>
-            <a:r>
-              <a:rPr i="1" lang="en-GB">
-                <a:solidFill>
-                  <a:srgbClr val="000000"/>
-                </a:solidFill>
-                <a:latin typeface="Calibri"/>
-              </a:rPr>
-              <a:t>ClipLimit</a:t>
-            </a:r>
-            <a:endParaRPr/>
-          </a:p>
-        </p:txBody>
-      </p:sp>
-      <p:sp>
-        <p:nvSpPr>
-          <p:cNvPr id="50" name="CustomShape 15"/>
-          <p:cNvSpPr/>
-          <p:nvPr/>
-        </p:nvSpPr>
-        <p:spPr>
-          <a:xfrm>
-            <a:off x="2760480" y="582480"/>
-            <a:ext cx="1378800" cy="660240"/>
-          </a:xfrm>
-          <a:prstGeom prst="can">
-            <a:avLst>
-              <a:gd name="adj" fmla="val 25000"/>
-            </a:avLst>
-          </a:prstGeom>
-          <a:gradFill>
-            <a:gsLst>
-              <a:gs pos="0">
-                <a:srgbClr val="bfecff"/>
-              </a:gs>
-              <a:gs pos="100000">
-                <a:srgbClr val="e6f7ff"/>
-              </a:gs>
-            </a:gsLst>
-            <a:lin ang="16200000"/>
-          </a:gradFill>
-          <a:ln w="9360">
-            <a:solidFill>
-              <a:srgbClr val="46aac4"/>
-            </a:solidFill>
-            <a:round/>
-          </a:ln>
-        </p:spPr>
-        <p:txBody>
-          <a:bodyPr lIns="90000" rIns="90000" tIns="45000" bIns="45000" anchor="ctr"/>
-          <a:p>
-            <a:pPr algn="ctr">
-              <a:lnSpc>
-                <a:spcPct val="100000"/>
-              </a:lnSpc>
-            </a:pPr>
-            <a:r>
-              <a:rPr i="1" lang="en-GB">
-                <a:solidFill>
-                  <a:srgbClr val="000000"/>
-                </a:solidFill>
-                <a:latin typeface="Calibri"/>
-              </a:rPr>
-              <a:t>Ry</a:t>
-            </a:r>
-            <a:endParaRPr/>
-          </a:p>
-        </p:txBody>
-      </p:sp>
-      <p:sp>
-        <p:nvSpPr>
-          <p:cNvPr id="51" name="CustomShape 16"/>
-          <p:cNvSpPr/>
-          <p:nvPr/>
-        </p:nvSpPr>
-        <p:spPr>
-          <a:xfrm>
-            <a:off x="2760480" y="70560"/>
-            <a:ext cx="1378800" cy="660240"/>
-          </a:xfrm>
-          <a:prstGeom prst="can">
-            <a:avLst>
-              <a:gd name="adj" fmla="val 25000"/>
-            </a:avLst>
-          </a:prstGeom>
-          <a:gradFill>
-            <a:gsLst>
-              <a:gs pos="0">
-                <a:srgbClr val="bfecff"/>
-              </a:gs>
-              <a:gs pos="100000">
-                <a:srgbClr val="e6f7ff"/>
-              </a:gs>
-            </a:gsLst>
-            <a:lin ang="16200000"/>
-          </a:gradFill>
-          <a:ln w="9360">
-            <a:solidFill>
-              <a:srgbClr val="46aac4"/>
-            </a:solidFill>
-            <a:round/>
-          </a:ln>
-        </p:spPr>
-        <p:txBody>
-          <a:bodyPr lIns="90000" rIns="90000" tIns="45000" bIns="45000" anchor="ctr"/>
-          <a:p>
-            <a:pPr algn="ctr">
-              <a:lnSpc>
-                <a:spcPct val="100000"/>
-              </a:lnSpc>
-            </a:pPr>
-            <a:r>
-              <a:rPr i="1" lang="en-GB">
-                <a:solidFill>
-                  <a:srgbClr val="000000"/>
-                </a:solidFill>
-                <a:latin typeface="Calibri"/>
-              </a:rPr>
-              <a:t>Rx</a:t>
-            </a:r>
-            <a:endParaRPr/>
-          </a:p>
-        </p:txBody>
-      </p:sp>
-      <p:sp>
-        <p:nvSpPr>
-          <p:cNvPr id="52" name="CustomShape 17"/>
-          <p:cNvSpPr/>
-          <p:nvPr/>
-        </p:nvSpPr>
-        <p:spPr>
-          <a:xfrm>
-            <a:off x="448560" y="6924600"/>
-            <a:ext cx="3167280" cy="1945800"/>
-          </a:xfrm>
-          <a:prstGeom prst="cube">
-            <a:avLst>
-              <a:gd name="adj" fmla="val 25000"/>
-            </a:avLst>
-          </a:prstGeom>
-          <a:solidFill>
-            <a:srgbClr val="4f81bd"/>
-          </a:solidFill>
-          <a:ln w="25560">
-            <a:solidFill>
-              <a:srgbClr val="3a5f8b"/>
-            </a:solidFill>
-            <a:round/>
-          </a:ln>
-        </p:spPr>
-        <p:txBody>
-          <a:bodyPr lIns="90000" rIns="90000" tIns="45000" bIns="45000" anchor="ctr"/>
-          <a:p>
-            <a:pPr algn="ctr">
-              <a:lnSpc>
-                <a:spcPct val="100000"/>
-              </a:lnSpc>
-            </a:pPr>
-            <a:r>
-              <a:rPr lang="en-GB" sz="2500">
-                <a:solidFill>
-                  <a:srgbClr val="ffffff"/>
-                </a:solidFill>
-                <a:latin typeface="Calibri"/>
-              </a:rPr>
-              <a:t>Pareto Set</a:t>
-            </a:r>
-            <a:endParaRPr/>
-          </a:p>
-        </p:txBody>
-      </p:sp>
-      <p:sp>
-        <p:nvSpPr>
-          <p:cNvPr id="53" name="CustomShape 18"/>
-          <p:cNvSpPr/>
-          <p:nvPr/>
-        </p:nvSpPr>
-        <p:spPr>
-          <a:xfrm flipH="1">
-            <a:off x="3615480" y="7884000"/>
-            <a:ext cx="934920" cy="360"/>
-          </a:xfrm>
-          <a:prstGeom prst="straightConnector1">
-            <a:avLst/>
-          </a:prstGeom>
-          <a:noFill/>
-          <a:ln w="38160">
-            <a:solidFill>
-              <a:srgbClr val="4f81bd"/>
-            </a:solidFill>
-            <a:round/>
-            <a:tailEnd len="med" type="arrow" w="med"/>
-          </a:ln>
-        </p:spPr>
-      </p:sp>
-      <p:sp>
-        <p:nvSpPr>
-          <p:cNvPr id="54" name="CustomShape 19"/>
-          <p:cNvSpPr/>
-          <p:nvPr/>
-        </p:nvSpPr>
-        <p:spPr>
-          <a:xfrm flipH="1">
-            <a:off x="6062040" y="4284000"/>
-            <a:ext cx="360" cy="629280"/>
-          </a:xfrm>
-          <a:prstGeom prst="straightConnector1">
-            <a:avLst/>
-          </a:prstGeom>
-          <a:noFill/>
-          <a:ln w="38160">
-            <a:solidFill>
-              <a:srgbClr val="4f81bd"/>
-            </a:solidFill>
-            <a:round/>
-            <a:tailEnd len="med" type="arrow" w="med"/>
-          </a:ln>
-        </p:spPr>
+            <a:endParaRPr lang="es-ES" dirty="0"/>
+          </a:p>
+        </p:txBody>
       </p:sp>
     </p:spTree>
   </p:cSld>
+  <p:clrMapOvr>
+    <a:masterClrMapping/>
+  </p:clrMapOvr>
   <p:timing>
     <p:tnLst>
       <p:par>
@@ -2139,14 +2412,14 @@
             <p:seq>
               <p:cTn id="2" nodeType="mainSeq"/>
               <p:prevCondLst>
-                <p:cond delay="0" evt="onPrev">
+                <p:cond evt="onPrev" delay="0">
                   <p:tgtEl>
                     <p:sldTgt/>
                   </p:tgtEl>
                 </p:cond>
               </p:prevCondLst>
               <p:nextCondLst>
-                <p:cond delay="0" evt="onNext">
+                <p:cond evt="onNext" delay="0">
                   <p:tgtEl>
                     <p:sldTgt/>
                   </p:tgtEl>
@@ -2381,5 +2654,7 @@
       </a:bgFillStyleLst>
     </a:fmtScheme>
   </a:themeElements>
+  <a:objectDefaults/>
+  <a:extraClrSchemeLst/>
 </a:theme>
 </file>
</xml_diff>